<commit_message>
Updated Introduction to AngularJS presentation
</commit_message>
<xml_diff>
--- a/AngularJS/1.1. Introduction-to-AngularJS.pptx
+++ b/AngularJS/1.1. Introduction-to-AngularJS.pptx
@@ -5,10 +5,10 @@
     <p:sldMasterId id="2147483660" r:id="rId2"/>
   </p:sldMasterIdLst>
   <p:notesMasterIdLst>
-    <p:notesMasterId r:id="rId20"/>
+    <p:notesMasterId r:id="rId19"/>
   </p:notesMasterIdLst>
   <p:handoutMasterIdLst>
-    <p:handoutMasterId r:id="rId21"/>
+    <p:handoutMasterId r:id="rId20"/>
   </p:handoutMasterIdLst>
   <p:sldIdLst>
     <p:sldId id="274" r:id="rId3"/>
@@ -22,12 +22,11 @@
     <p:sldId id="432" r:id="rId11"/>
     <p:sldId id="433" r:id="rId12"/>
     <p:sldId id="435" r:id="rId13"/>
-    <p:sldId id="436" r:id="rId14"/>
-    <p:sldId id="434" r:id="rId15"/>
-    <p:sldId id="417" r:id="rId16"/>
-    <p:sldId id="437" r:id="rId17"/>
-    <p:sldId id="419" r:id="rId18"/>
-    <p:sldId id="420" r:id="rId19"/>
+    <p:sldId id="434" r:id="rId14"/>
+    <p:sldId id="417" r:id="rId15"/>
+    <p:sldId id="437" r:id="rId16"/>
+    <p:sldId id="419" r:id="rId17"/>
+    <p:sldId id="420" r:id="rId18"/>
   </p:sldIdLst>
   <p:sldSz cx="12188825" cy="6858000"/>
   <p:notesSz cx="6858000" cy="9144000"/>
@@ -248,7 +247,7 @@
             <a:fld id="{FE5B4EDC-59C0-49C7-8ADA-5A781B329E02}" type="datetimeFigureOut">
               <a:rPr lang="en-US"/>
               <a:pPr/>
-              <a:t>5/5/2015</a:t>
+              <a:t>09-Jun-15</a:t>
             </a:fld>
             <a:endParaRPr dirty="0"/>
           </a:p>
@@ -447,7 +446,7 @@
             <a:fld id="{F2D8D46A-B586-417D-BFBD-8C8FE0AAF762}" type="datetimeFigureOut">
               <a:rPr lang="en-US" smtClean="0"/>
               <a:pPr/>
-              <a:t>5/5/2015</a:t>
+              <a:t>09-Jun-15</a:t>
             </a:fld>
             <a:endParaRPr lang="en-US"/>
           </a:p>
@@ -1196,7 +1195,7 @@
             <a:fld id="{3EBA5BD7-F043-4D1B-AA17-CD412FC534DE}" type="slidenum">
               <a:rPr lang="en-US" smtClean="0"/>
               <a:pPr/>
-              <a:t>15</a:t>
+              <a:t>14</a:t>
             </a:fld>
             <a:endParaRPr lang="en-US" dirty="0"/>
           </a:p>
@@ -1331,7 +1330,7 @@
             <a:fld id="{3EBA5BD7-F043-4D1B-AA17-CD412FC534DE}" type="slidenum">
               <a:rPr lang="en-US" smtClean="0"/>
               <a:pPr/>
-              <a:t>16</a:t>
+              <a:t>15</a:t>
             </a:fld>
             <a:endParaRPr lang="en-US" dirty="0"/>
           </a:p>
@@ -1466,7 +1465,7 @@
             <a:fld id="{3EBA5BD7-F043-4D1B-AA17-CD412FC534DE}" type="slidenum">
               <a:rPr lang="en-US" smtClean="0"/>
               <a:pPr/>
-              <a:t>17</a:t>
+              <a:t>16</a:t>
             </a:fld>
             <a:endParaRPr lang="en-US" dirty="0"/>
           </a:p>
@@ -2095,7 +2094,7 @@
             <a:fld id="{055373AC-9AA7-423B-BA00-BA1C74164DBD}" type="datetime1">
               <a:rPr lang="en-US" smtClean="0"/>
               <a:pPr/>
-              <a:t>5/5/2015</a:t>
+              <a:t>09-Jun-15</a:t>
             </a:fld>
             <a:endParaRPr lang="en-US" dirty="0"/>
           </a:p>
@@ -3366,7 +3365,7 @@
             <a:fld id="{055373AC-9AA7-423B-BA00-BA1C74164DBD}" type="datetime1">
               <a:rPr lang="en-US" smtClean="0"/>
               <a:pPr/>
-              <a:t>5/5/2015</a:t>
+              <a:t>09-Jun-15</a:t>
             </a:fld>
             <a:endParaRPr lang="en-US" dirty="0"/>
           </a:p>
@@ -4639,143 +4638,6 @@
       </p:grpSpPr>
       <p:sp>
         <p:nvSpPr>
-          <p:cNvPr id="2" name="Title 1"/>
-          <p:cNvSpPr>
-            <a:spLocks noGrp="1"/>
-          </p:cNvSpPr>
-          <p:nvPr>
-            <p:ph type="title"/>
-          </p:nvPr>
-        </p:nvSpPr>
-        <p:spPr/>
-        <p:txBody>
-          <a:bodyPr/>
-          <a:lstStyle/>
-          <a:p>
-            <a:r>
-              <a:rPr lang="en-GB" dirty="0" smtClean="0"/>
-              <a:t>AngularJS Seed</a:t>
-            </a:r>
-            <a:endParaRPr lang="en-GB" dirty="0"/>
-          </a:p>
-        </p:txBody>
-      </p:sp>
-      <p:sp>
-        <p:nvSpPr>
-          <p:cNvPr id="3" name="Text Placeholder 2"/>
-          <p:cNvSpPr>
-            <a:spLocks noGrp="1"/>
-          </p:cNvSpPr>
-          <p:nvPr>
-            <p:ph type="body" idx="1"/>
-          </p:nvPr>
-        </p:nvSpPr>
-        <p:spPr>
-          <a:xfrm>
-            <a:off x="1164484" y="5754968"/>
-            <a:ext cx="9501928" cy="692873"/>
-          </a:xfrm>
-        </p:spPr>
-        <p:txBody>
-          <a:bodyPr/>
-          <a:lstStyle/>
-          <a:p>
-            <a:r>
-              <a:rPr lang="en-GB" dirty="0" smtClean="0"/>
-              <a:t>Live Demo</a:t>
-            </a:r>
-            <a:endParaRPr lang="en-GB" dirty="0"/>
-          </a:p>
-        </p:txBody>
-      </p:sp>
-      <p:pic>
-        <p:nvPicPr>
-          <p:cNvPr id="1028" name="Picture 4" descr="http://img3.wikia.nocookie.net/__cb20120729040555/elderscrolls/images/e/e5/Skeleton_MW.png"/>
-          <p:cNvPicPr>
-            <a:picLocks noChangeAspect="1" noChangeArrowheads="1"/>
-          </p:cNvPicPr>
-          <p:nvPr/>
-        </p:nvPicPr>
-        <p:blipFill>
-          <a:blip r:embed="rId2">
-            <a:extLst>
-              <a:ext uri="{28A0092B-C50C-407E-A947-70E740481C1C}">
-                <a14:useLocalDpi xmlns:a14="http://schemas.microsoft.com/office/drawing/2010/main" val="0"/>
-              </a:ext>
-            </a:extLst>
-          </a:blip>
-          <a:srcRect/>
-          <a:stretch>
-            <a:fillRect/>
-          </a:stretch>
-        </p:blipFill>
-        <p:spPr bwMode="auto">
-          <a:xfrm>
-            <a:off x="4820857" y="1219200"/>
-            <a:ext cx="2189182" cy="3484282"/>
-          </a:xfrm>
-          <a:prstGeom prst="rect">
-            <a:avLst/>
-          </a:prstGeom>
-          <a:noFill/>
-          <a:extLst>
-            <a:ext uri="{909E8E84-426E-40DD-AFC4-6F175D3DCCD1}">
-              <a14:hiddenFill xmlns:a14="http://schemas.microsoft.com/office/drawing/2010/main">
-                <a:solidFill>
-                  <a:srgbClr val="FFFFFF"/>
-                </a:solidFill>
-              </a14:hiddenFill>
-            </a:ext>
-          </a:extLst>
-        </p:spPr>
-      </p:pic>
-    </p:spTree>
-    <p:extLst>
-      <p:ext uri="{BB962C8B-B14F-4D97-AF65-F5344CB8AC3E}">
-        <p14:creationId xmlns:p14="http://schemas.microsoft.com/office/powerpoint/2010/main" val="4241000296"/>
-      </p:ext>
-    </p:extLst>
-  </p:cSld>
-  <p:clrMapOvr>
-    <a:masterClrMapping/>
-  </p:clrMapOvr>
-  <mc:AlternateContent xmlns:mc="http://schemas.openxmlformats.org/markup-compatibility/2006" xmlns:p14="http://schemas.microsoft.com/office/powerpoint/2010/main">
-    <mc:Choice Requires="p14">
-      <p:transition p14:dur="0"/>
-    </mc:Choice>
-    <mc:Fallback xmlns="">
-      <p:transition/>
-    </mc:Fallback>
-  </mc:AlternateContent>
-  <p:timing>
-    <p:tnLst>
-      <p:par>
-        <p:cTn id="1" dur="indefinite" restart="never" nodeType="tmRoot"/>
-      </p:par>
-    </p:tnLst>
-  </p:timing>
-</p:sld>
-</file>
-
-<file path=ppt/slides/slide13.xml><?xml version="1.0" encoding="utf-8"?>
-<p:sld xmlns:a="http://schemas.openxmlformats.org/drawingml/2006/main" xmlns:r="http://schemas.openxmlformats.org/officeDocument/2006/relationships" xmlns:p="http://schemas.openxmlformats.org/presentationml/2006/main">
-  <p:cSld>
-    <p:spTree>
-      <p:nvGrpSpPr>
-        <p:cNvPr id="1" name=""/>
-        <p:cNvGrpSpPr/>
-        <p:nvPr/>
-      </p:nvGrpSpPr>
-      <p:grpSpPr>
-        <a:xfrm>
-          <a:off x="0" y="0"/>
-          <a:ext cx="0" cy="0"/>
-          <a:chOff x="0" y="0"/>
-          <a:chExt cx="0" cy="0"/>
-        </a:xfrm>
-      </p:grpSpPr>
-      <p:sp>
-        <p:nvSpPr>
           <p:cNvPr id="5" name="Content Placeholder 4"/>
           <p:cNvSpPr>
             <a:spLocks noGrp="1"/>
@@ -4819,7 +4681,15 @@
           <a:p>
             <a:r>
               <a:rPr lang="en-GB" dirty="0" smtClean="0"/>
-              <a:t>WebStorm / Sublime Text / other HTML5 editor</a:t>
+              <a:t>Visual Studio / WebStorm </a:t>
+            </a:r>
+            <a:r>
+              <a:rPr lang="en-GB" dirty="0" smtClean="0"/>
+              <a:t>/ Sublime </a:t>
+            </a:r>
+            <a:r>
+              <a:rPr lang="en-GB" dirty="0" smtClean="0"/>
+              <a:t>Text …</a:t>
             </a:r>
           </a:p>
           <a:p>
@@ -4832,7 +4702,19 @@
             <a:pPr lvl="1"/>
             <a:r>
               <a:rPr lang="en-GB" dirty="0" smtClean="0"/>
-              <a:t>E.g. a Node.js-based HTTP server or Apache</a:t>
+              <a:t>Visual Studio IIS Express</a:t>
+            </a:r>
+            <a:endParaRPr lang="en-GB" dirty="0" smtClean="0"/>
+          </a:p>
+          <a:p>
+            <a:pPr lvl="1"/>
+            <a:r>
+              <a:rPr lang="en-GB" dirty="0" smtClean="0"/>
+              <a:t>E.g</a:t>
+            </a:r>
+            <a:r>
+              <a:rPr lang="en-GB" dirty="0" smtClean="0"/>
+              <a:t>. a Node.js-based HTTP server or Apache</a:t>
             </a:r>
           </a:p>
           <a:p>
@@ -5096,33 +4978,15 @@
                                   </p:childTnLst>
                                 </p:cTn>
                               </p:par>
-                            </p:childTnLst>
-                          </p:cTn>
-                        </p:par>
-                      </p:childTnLst>
-                    </p:cTn>
-                  </p:par>
-                  <p:par>
-                    <p:cTn id="19" fill="hold">
-                      <p:stCondLst>
-                        <p:cond delay="indefinite"/>
-                      </p:stCondLst>
-                      <p:childTnLst>
-                        <p:par>
-                          <p:cTn id="20" fill="hold">
-                            <p:stCondLst>
-                              <p:cond delay="0"/>
-                            </p:stCondLst>
-                            <p:childTnLst>
                               <p:par>
-                                <p:cTn id="21" presetID="1" presetClass="entr" presetSubtype="0" fill="hold" grpId="0" nodeType="clickEffect">
+                                <p:cTn id="19" presetID="1" presetClass="entr" presetSubtype="0" fill="hold" grpId="0" nodeType="withEffect">
                                   <p:stCondLst>
                                     <p:cond delay="0"/>
                                   </p:stCondLst>
                                   <p:childTnLst>
                                     <p:set>
                                       <p:cBhvr>
-                                        <p:cTn id="22" dur="1" fill="hold">
+                                        <p:cTn id="20" dur="1" fill="hold">
                                           <p:stCondLst>
                                             <p:cond delay="0"/>
                                           </p:stCondLst>
@@ -5131,6 +4995,55 @@
                                           <p:spTgt spid="5">
                                             <p:txEl>
                                               <p:pRg st="5" end="5"/>
+                                            </p:txEl>
+                                          </p:spTgt>
+                                        </p:tgtEl>
+                                        <p:attrNameLst>
+                                          <p:attrName>style.visibility</p:attrName>
+                                        </p:attrNameLst>
+                                      </p:cBhvr>
+                                      <p:to>
+                                        <p:strVal val="visible"/>
+                                      </p:to>
+                                    </p:set>
+                                  </p:childTnLst>
+                                </p:cTn>
+                              </p:par>
+                            </p:childTnLst>
+                          </p:cTn>
+                        </p:par>
+                      </p:childTnLst>
+                    </p:cTn>
+                  </p:par>
+                  <p:par>
+                    <p:cTn id="21" fill="hold">
+                      <p:stCondLst>
+                        <p:cond delay="indefinite"/>
+                      </p:stCondLst>
+                      <p:childTnLst>
+                        <p:par>
+                          <p:cTn id="22" fill="hold">
+                            <p:stCondLst>
+                              <p:cond delay="0"/>
+                            </p:stCondLst>
+                            <p:childTnLst>
+                              <p:par>
+                                <p:cTn id="23" presetID="1" presetClass="entr" presetSubtype="0" fill="hold" grpId="0" nodeType="clickEffect">
+                                  <p:stCondLst>
+                                    <p:cond delay="0"/>
+                                  </p:stCondLst>
+                                  <p:childTnLst>
+                                    <p:set>
+                                      <p:cBhvr>
+                                        <p:cTn id="24" dur="1" fill="hold">
+                                          <p:stCondLst>
+                                            <p:cond delay="0"/>
+                                          </p:stCondLst>
+                                        </p:cTn>
+                                        <p:tgtEl>
+                                          <p:spTgt spid="5">
+                                            <p:txEl>
+                                              <p:pRg st="6" end="6"/>
                                             </p:txEl>
                                           </p:spTgt>
                                         </p:tgtEl>
@@ -5179,7 +5092,7 @@
 </p:sld>
 </file>
 
-<file path=ppt/slides/slide14.xml><?xml version="1.0" encoding="utf-8"?>
+<file path=ppt/slides/slide13.xml><?xml version="1.0" encoding="utf-8"?>
 <p:sld xmlns:a="http://schemas.openxmlformats.org/drawingml/2006/main" xmlns:r="http://schemas.openxmlformats.org/officeDocument/2006/relationships" xmlns:p="http://schemas.openxmlformats.org/presentationml/2006/main">
   <p:cSld>
     <p:spTree>
@@ -5214,7 +5127,7 @@
             <a:fld id="{C014DD1E-5D91-48A3-AD6D-45FBA980D106}" type="slidenum">
               <a:rPr lang="en-US" smtClean="0"/>
               <a:pPr/>
-              <a:t>14</a:t>
+              <a:t>13</a:t>
             </a:fld>
             <a:endParaRPr lang="en-US" dirty="0"/>
           </a:p>
@@ -5523,7 +5436,7 @@
 </p:sld>
 </file>
 
-<file path=ppt/slides/slide15.xml><?xml version="1.0" encoding="utf-8"?>
+<file path=ppt/slides/slide14.xml><?xml version="1.0" encoding="utf-8"?>
 <p:sld xmlns:a="http://schemas.openxmlformats.org/drawingml/2006/main" xmlns:r="http://schemas.openxmlformats.org/officeDocument/2006/relationships" xmlns:p="http://schemas.openxmlformats.org/presentationml/2006/main">
   <p:cSld>
     <p:spTree>
@@ -5943,7 +5856,7 @@
 </p:sld>
 </file>
 
-<file path=ppt/slides/slide16.xml><?xml version="1.0" encoding="utf-8"?>
+<file path=ppt/slides/slide15.xml><?xml version="1.0" encoding="utf-8"?>
 <p:sld xmlns:a="http://schemas.openxmlformats.org/drawingml/2006/main" xmlns:r="http://schemas.openxmlformats.org/officeDocument/2006/relationships" xmlns:p="http://schemas.openxmlformats.org/presentationml/2006/main">
   <p:cSld>
     <p:spTree>
@@ -6093,7 +6006,7 @@
             <a:fld id="{C014DD1E-5D91-48A3-AD6D-45FBA980D106}" type="slidenum">
               <a:rPr lang="en-US" smtClean="0"/>
               <a:pPr/>
-              <a:t>16</a:t>
+              <a:t>15</a:t>
             </a:fld>
             <a:endParaRPr lang="en-US" dirty="0"/>
           </a:p>
@@ -6252,7 +6165,7 @@
 </p:sld>
 </file>
 
-<file path=ppt/slides/slide17.xml><?xml version="1.0" encoding="utf-8"?>
+<file path=ppt/slides/slide16.xml><?xml version="1.0" encoding="utf-8"?>
 <p:sld xmlns:a="http://schemas.openxmlformats.org/drawingml/2006/main" xmlns:r="http://schemas.openxmlformats.org/officeDocument/2006/relationships" xmlns:p="http://schemas.openxmlformats.org/presentationml/2006/main">
   <p:cSld>
     <p:spTree>
@@ -7253,11 +7166,7 @@
             <a:pPr lvl="1"/>
             <a:r>
               <a:rPr lang="en-GB" dirty="0" smtClean="0"/>
-              <a:t>Owned and </a:t>
-            </a:r>
-            <a:r>
-              <a:rPr lang="en-GB" dirty="0" smtClean="0"/>
-              <a:t>maintained by </a:t>
+              <a:t>Owned and maintained by </a:t>
             </a:r>
             <a:r>
               <a:rPr lang="en-GB" b="1" dirty="0" smtClean="0">

</xml_diff>